<commit_message>
Update slides on x86 functions (Assembly F'24)
</commit_message>
<xml_diff>
--- a/courses/24F/Assembly/notes/06_x863_proc1.pptx
+++ b/courses/24F/Assembly/notes/06_x863_proc1.pptx
@@ -182,14 +182,6 @@
     </p:ext>
   </p:extLst>
 </p:presentation>
-</file>
-
-<file path=ppt/revisionInfo.xml><?xml version="1.0" encoding="utf-8"?>
-<p1510:revInfo xmlns:a="http://schemas.openxmlformats.org/drawingml/2006/main" xmlns:r="http://schemas.openxmlformats.org/officeDocument/2006/relationships" xmlns:p1510="http://schemas.microsoft.com/office/powerpoint/2015/10/main">
-  <p1510:revLst>
-    <p1510:client id="{CF7F5ADC-53C4-E748-8DF3-A82F5506A37C}" v="7" dt="2023-11-13T15:11:23.349"/>
-  </p1510:revLst>
-</p1510:revInfo>
 </file>
 
 <file path=ppt/changesInfos/changesInfo1.xml><?xml version="1.0" encoding="utf-8"?>
@@ -525,6 +517,46 @@
       </pc:sldChg>
     </pc:docChg>
   </pc:docChgLst>
+  <pc:docChgLst>
+    <pc:chgData name="Downen, Paul M" userId="b1fad98d-9c85-4afc-93ea-92c67574f2bd" providerId="ADAL" clId="{8060D5B1-E47F-C74B-9E25-FDDDF1D6878F}"/>
+    <pc:docChg chg="custSel modSld">
+      <pc:chgData name="Downen, Paul M" userId="b1fad98d-9c85-4afc-93ea-92c67574f2bd" providerId="ADAL" clId="{8060D5B1-E47F-C74B-9E25-FDDDF1D6878F}" dt="2024-11-08T17:54:14.555" v="65" actId="20577"/>
+      <pc:docMkLst>
+        <pc:docMk/>
+      </pc:docMkLst>
+      <pc:sldChg chg="addSp delSp modSp mod">
+        <pc:chgData name="Downen, Paul M" userId="b1fad98d-9c85-4afc-93ea-92c67574f2bd" providerId="ADAL" clId="{8060D5B1-E47F-C74B-9E25-FDDDF1D6878F}" dt="2024-11-08T17:54:14.555" v="65" actId="20577"/>
+        <pc:sldMkLst>
+          <pc:docMk/>
+          <pc:sldMk cId="1414420608" sldId="738"/>
+        </pc:sldMkLst>
+        <pc:spChg chg="mod">
+          <ac:chgData name="Downen, Paul M" userId="b1fad98d-9c85-4afc-93ea-92c67574f2bd" providerId="ADAL" clId="{8060D5B1-E47F-C74B-9E25-FDDDF1D6878F}" dt="2024-11-08T17:53:39.723" v="57" actId="1076"/>
+          <ac:spMkLst>
+            <pc:docMk/>
+            <pc:sldMk cId="1414420608" sldId="738"/>
+            <ac:spMk id="3" creationId="{5FF641B1-9853-0047-8F6C-B76758F591CE}"/>
+          </ac:spMkLst>
+        </pc:spChg>
+        <pc:spChg chg="mod">
+          <ac:chgData name="Downen, Paul M" userId="b1fad98d-9c85-4afc-93ea-92c67574f2bd" providerId="ADAL" clId="{8060D5B1-E47F-C74B-9E25-FDDDF1D6878F}" dt="2024-11-08T17:54:14.555" v="65" actId="20577"/>
+          <ac:spMkLst>
+            <pc:docMk/>
+            <pc:sldMk cId="1414420608" sldId="738"/>
+            <ac:spMk id="4" creationId="{5642A1C2-0513-5D43-A0F3-5EB94086AEE8}"/>
+          </ac:spMkLst>
+        </pc:spChg>
+        <pc:spChg chg="add del mod">
+          <ac:chgData name="Downen, Paul M" userId="b1fad98d-9c85-4afc-93ea-92c67574f2bd" providerId="ADAL" clId="{8060D5B1-E47F-C74B-9E25-FDDDF1D6878F}" dt="2024-11-08T17:54:12.366" v="61" actId="21"/>
+          <ac:spMkLst>
+            <pc:docMk/>
+            <pc:sldMk cId="1414420608" sldId="738"/>
+            <ac:spMk id="6" creationId="{617B1CA0-0E23-D8C6-9017-8D0B07507C45}"/>
+          </ac:spMkLst>
+        </pc:spChg>
+      </pc:sldChg>
+    </pc:docChg>
+  </pc:docChgLst>
 </pc:chgInfo>
 </file>
 
@@ -649,7 +681,7 @@
               <a:pPr>
                 <a:defRPr/>
               </a:pPr>
-              <a:t>11/13/23</a:t>
+              <a:t>11/8/24</a:t>
             </a:fld>
             <a:endParaRPr lang="en-US" altLang="en-US"/>
           </a:p>
@@ -41597,7 +41629,7 @@
         </p:nvSpPr>
         <p:spPr bwMode="auto">
           <a:xfrm>
-            <a:off x="457200" y="2514600"/>
+            <a:off x="152400" y="2514600"/>
             <a:ext cx="2667000" cy="1828800"/>
           </a:xfrm>
           <a:prstGeom prst="rect">
@@ -41728,8 +41760,8 @@
         </p:nvSpPr>
         <p:spPr bwMode="auto">
           <a:xfrm>
-            <a:off x="3352800" y="1981200"/>
-            <a:ext cx="5417821" cy="3505200"/>
+            <a:off x="2971800" y="1981200"/>
+            <a:ext cx="6019800" cy="3657600"/>
           </a:xfrm>
           <a:prstGeom prst="rect">
             <a:avLst/>
@@ -41855,6 +41887,51 @@
                 <a:cs typeface="Courier New" panose="02070309020205020404" pitchFamily="49" charset="0"/>
               </a:rPr>
               <a:t>         # enter</a:t>
+            </a:r>
+          </a:p>
+          <a:p>
+            <a:pPr algn="l"/>
+            <a:r>
+              <a:rPr lang="en-US" sz="1800" b="0" dirty="0">
+                <a:latin typeface="Courier New" panose="02070309020205020404" pitchFamily="49" charset="0"/>
+                <a:cs typeface="Courier New" panose="02070309020205020404" pitchFamily="49" charset="0"/>
+              </a:rPr>
+              <a:t>  </a:t>
+            </a:r>
+            <a:r>
+              <a:rPr lang="en-US" sz="1800" b="0" dirty="0" err="1">
+                <a:latin typeface="Courier New" panose="02070309020205020404" pitchFamily="49" charset="0"/>
+                <a:cs typeface="Courier New" panose="02070309020205020404" pitchFamily="49" charset="0"/>
+              </a:rPr>
+              <a:t>subq</a:t>
+            </a:r>
+            <a:r>
+              <a:rPr lang="en-US" sz="1800" b="0" dirty="0">
+                <a:latin typeface="Courier New" panose="02070309020205020404" pitchFamily="49" charset="0"/>
+                <a:cs typeface="Courier New" panose="02070309020205020404" pitchFamily="49" charset="0"/>
+              </a:rPr>
+              <a:t>  %</a:t>
+            </a:r>
+            <a:r>
+              <a:rPr lang="en-US" sz="1800" b="0" dirty="0" err="1">
+                <a:latin typeface="Courier New" panose="02070309020205020404" pitchFamily="49" charset="0"/>
+                <a:cs typeface="Courier New" panose="02070309020205020404" pitchFamily="49" charset="0"/>
+              </a:rPr>
+              <a:t>rsp</a:t>
+            </a:r>
+            <a:r>
+              <a:rPr lang="en-US" sz="1800" b="0">
+                <a:latin typeface="Courier New" panose="02070309020205020404" pitchFamily="49" charset="0"/>
+                <a:cs typeface="Courier New" panose="02070309020205020404" pitchFamily="49" charset="0"/>
+              </a:rPr>
+              <a:t>, 32           </a:t>
+            </a:r>
+            <a:r>
+              <a:rPr lang="en-US" sz="1800" b="0" dirty="0">
+                <a:latin typeface="Courier New" panose="02070309020205020404" pitchFamily="49" charset="0"/>
+                <a:cs typeface="Courier New" panose="02070309020205020404" pitchFamily="49" charset="0"/>
+              </a:rPr>
+              <a:t># allocate frame</a:t>
             </a:r>
           </a:p>
           <a:p>

</xml_diff>

<commit_message>
Fix typo in slides (Assembly F'24)
</commit_message>
<xml_diff>
--- a/courses/24F/Assembly/notes/06_x863_proc1.pptx
+++ b/courses/24F/Assembly/notes/06_x863_proc1.pptx
@@ -519,13 +519,28 @@
   </pc:docChgLst>
   <pc:docChgLst>
     <pc:chgData name="Downen, Paul M" userId="b1fad98d-9c85-4afc-93ea-92c67574f2bd" providerId="ADAL" clId="{8060D5B1-E47F-C74B-9E25-FDDDF1D6878F}"/>
-    <pc:docChg chg="custSel modSld">
-      <pc:chgData name="Downen, Paul M" userId="b1fad98d-9c85-4afc-93ea-92c67574f2bd" providerId="ADAL" clId="{8060D5B1-E47F-C74B-9E25-FDDDF1D6878F}" dt="2024-11-08T17:54:14.555" v="65" actId="20577"/>
+    <pc:docChg chg="undo custSel modSld">
+      <pc:chgData name="Downen, Paul M" userId="b1fad98d-9c85-4afc-93ea-92c67574f2bd" providerId="ADAL" clId="{8060D5B1-E47F-C74B-9E25-FDDDF1D6878F}" dt="2024-11-08T19:01:19.769" v="90" actId="20577"/>
       <pc:docMkLst>
         <pc:docMk/>
       </pc:docMkLst>
+      <pc:sldChg chg="modSp mod">
+        <pc:chgData name="Downen, Paul M" userId="b1fad98d-9c85-4afc-93ea-92c67574f2bd" providerId="ADAL" clId="{8060D5B1-E47F-C74B-9E25-FDDDF1D6878F}" dt="2024-11-08T19:01:00.381" v="77" actId="20577"/>
+        <pc:sldMkLst>
+          <pc:docMk/>
+          <pc:sldMk cId="3118066907" sldId="737"/>
+        </pc:sldMkLst>
+        <pc:spChg chg="mod">
+          <ac:chgData name="Downen, Paul M" userId="b1fad98d-9c85-4afc-93ea-92c67574f2bd" providerId="ADAL" clId="{8060D5B1-E47F-C74B-9E25-FDDDF1D6878F}" dt="2024-11-08T19:01:00.381" v="77" actId="20577"/>
+          <ac:spMkLst>
+            <pc:docMk/>
+            <pc:sldMk cId="3118066907" sldId="737"/>
+            <ac:spMk id="4" creationId="{FC07A79B-6EC3-714C-8B46-84808921D5F5}"/>
+          </ac:spMkLst>
+        </pc:spChg>
+      </pc:sldChg>
       <pc:sldChg chg="addSp delSp modSp mod">
-        <pc:chgData name="Downen, Paul M" userId="b1fad98d-9c85-4afc-93ea-92c67574f2bd" providerId="ADAL" clId="{8060D5B1-E47F-C74B-9E25-FDDDF1D6878F}" dt="2024-11-08T17:54:14.555" v="65" actId="20577"/>
+        <pc:chgData name="Downen, Paul M" userId="b1fad98d-9c85-4afc-93ea-92c67574f2bd" providerId="ADAL" clId="{8060D5B1-E47F-C74B-9E25-FDDDF1D6878F}" dt="2024-11-08T19:01:19.769" v="90" actId="20577"/>
         <pc:sldMkLst>
           <pc:docMk/>
           <pc:sldMk cId="1414420608" sldId="738"/>
@@ -539,7 +554,7 @@
           </ac:spMkLst>
         </pc:spChg>
         <pc:spChg chg="mod">
-          <ac:chgData name="Downen, Paul M" userId="b1fad98d-9c85-4afc-93ea-92c67574f2bd" providerId="ADAL" clId="{8060D5B1-E47F-C74B-9E25-FDDDF1D6878F}" dt="2024-11-08T17:54:14.555" v="65" actId="20577"/>
+          <ac:chgData name="Downen, Paul M" userId="b1fad98d-9c85-4afc-93ea-92c67574f2bd" providerId="ADAL" clId="{8060D5B1-E47F-C74B-9E25-FDDDF1D6878F}" dt="2024-11-08T19:01:19.769" v="90" actId="20577"/>
           <ac:spMkLst>
             <pc:docMk/>
             <pc:sldMk cId="1414420608" sldId="738"/>
@@ -41906,11 +41921,18 @@
               <a:t>subq</a:t>
             </a:r>
             <a:r>
+              <a:rPr lang="en-US" sz="1800" b="0">
+                <a:latin typeface="Courier New" panose="02070309020205020404" pitchFamily="49" charset="0"/>
+                <a:cs typeface="Courier New" panose="02070309020205020404" pitchFamily="49" charset="0"/>
+              </a:rPr>
+              <a:t>  $32, </a:t>
+            </a:r>
+            <a:r>
               <a:rPr lang="en-US" sz="1800" b="0" dirty="0">
                 <a:latin typeface="Courier New" panose="02070309020205020404" pitchFamily="49" charset="0"/>
                 <a:cs typeface="Courier New" panose="02070309020205020404" pitchFamily="49" charset="0"/>
               </a:rPr>
-              <a:t>  %</a:t>
+              <a:t>%</a:t>
             </a:r>
             <a:r>
               <a:rPr lang="en-US" sz="1800" b="0" dirty="0" err="1">
@@ -41920,18 +41942,11 @@
               <a:t>rsp</a:t>
             </a:r>
             <a:r>
-              <a:rPr lang="en-US" sz="1800" b="0">
-                <a:latin typeface="Courier New" panose="02070309020205020404" pitchFamily="49" charset="0"/>
-                <a:cs typeface="Courier New" panose="02070309020205020404" pitchFamily="49" charset="0"/>
-              </a:rPr>
-              <a:t>, 32           </a:t>
-            </a:r>
-            <a:r>
               <a:rPr lang="en-US" sz="1800" b="0" dirty="0">
                 <a:latin typeface="Courier New" panose="02070309020205020404" pitchFamily="49" charset="0"/>
                 <a:cs typeface="Courier New" panose="02070309020205020404" pitchFamily="49" charset="0"/>
               </a:rPr>
-              <a:t># allocate frame</a:t>
+              <a:t>          # allocate frame</a:t>
             </a:r>
           </a:p>
           <a:p>

</xml_diff>